<commit_message>
n records and species per year
</commit_message>
<xml_diff>
--- a/files/OBIS-wall.pptx
+++ b/files/OBIS-wall.pptx
@@ -3461,8 +3461,8 @@
         </p:blipFill>
         <p:spPr>
           <a:xfrm>
-            <a:off x="9345963" y="4292022"/>
-            <a:ext cx="1800000" cy="1800000"/>
+            <a:off x="6893920" y="4236562"/>
+            <a:ext cx="2160999" cy="2160999"/>
           </a:xfrm>
           <a:prstGeom prst="rect">
             <a:avLst/>
@@ -3606,6 +3606,256 @@
               <a:t>redlist</a:t>
             </a:r>
             <a:endParaRPr lang="en-GB" dirty="0"/>
+          </a:p>
+        </p:txBody>
+      </p:sp>
+      <p:sp>
+        <p:nvSpPr>
+          <p:cNvPr id="11" name="TextBox 10">
+            <a:extLst>
+              <a:ext uri="{FF2B5EF4-FFF2-40B4-BE49-F238E27FC236}">
+                <a16:creationId xmlns:a16="http://schemas.microsoft.com/office/drawing/2014/main" id="{7A3A3CFB-490F-9044-AFF8-915397CF7226}"/>
+              </a:ext>
+            </a:extLst>
+          </p:cNvPr>
+          <p:cNvSpPr txBox="1"/>
+          <p:nvPr/>
+        </p:nvSpPr>
+        <p:spPr>
+          <a:xfrm>
+            <a:off x="9054919" y="3972832"/>
+            <a:ext cx="3075970" cy="2862322"/>
+          </a:xfrm>
+          <a:prstGeom prst="rect">
+            <a:avLst/>
+          </a:prstGeom>
+          <a:noFill/>
+        </p:spPr>
+        <p:txBody>
+          <a:bodyPr wrap="none" rtlCol="0">
+            <a:spAutoFit/>
+          </a:bodyPr>
+          <a:lstStyle/>
+          <a:p>
+            <a:r>
+              <a:rPr lang="en-GB" dirty="0"/>
+              <a:t>Future</a:t>
+            </a:r>
+          </a:p>
+          <a:p>
+            <a:pPr marL="285750" indent="-285750">
+              <a:buFontTx/>
+              <a:buChar char="-"/>
+            </a:pPr>
+            <a:r>
+              <a:rPr lang="en-US" dirty="0"/>
+              <a:t>Environmental data</a:t>
+            </a:r>
+          </a:p>
+          <a:p>
+            <a:pPr marL="285750" indent="-285750">
+              <a:buFontTx/>
+              <a:buChar char="-"/>
+            </a:pPr>
+            <a:r>
+              <a:rPr lang="en-US" dirty="0"/>
+              <a:t>Tracking data</a:t>
+            </a:r>
+            <a:endParaRPr lang="fr-FR" dirty="0"/>
+          </a:p>
+          <a:p>
+            <a:pPr marL="285750" indent="-285750">
+              <a:buFontTx/>
+              <a:buChar char="-"/>
+            </a:pPr>
+            <a:r>
+              <a:rPr lang="en-US" dirty="0"/>
+              <a:t>DNA</a:t>
+            </a:r>
+          </a:p>
+          <a:p>
+            <a:pPr marL="285750" indent="-285750">
+              <a:buFontTx/>
+              <a:buChar char="-"/>
+            </a:pPr>
+            <a:r>
+              <a:rPr lang="en-US" dirty="0" err="1"/>
+              <a:t>eDNA</a:t>
+            </a:r>
+            <a:endParaRPr lang="en-US" dirty="0"/>
+          </a:p>
+          <a:p>
+            <a:pPr marL="285750" indent="-285750">
+              <a:buFontTx/>
+              <a:buChar char="-"/>
+            </a:pPr>
+            <a:r>
+              <a:rPr lang="en-US" dirty="0"/>
+              <a:t>Image/video data</a:t>
+            </a:r>
+          </a:p>
+          <a:p>
+            <a:pPr marL="285750" indent="-285750">
+              <a:buFontTx/>
+              <a:buChar char="-"/>
+            </a:pPr>
+            <a:r>
+              <a:rPr lang="en-US" dirty="0"/>
+              <a:t>Quality annotations</a:t>
+            </a:r>
+          </a:p>
+          <a:p>
+            <a:pPr marL="285750" indent="-285750">
+              <a:buFontTx/>
+              <a:buChar char="-"/>
+            </a:pPr>
+            <a:r>
+              <a:rPr lang="en-US" dirty="0"/>
+              <a:t>Text mining for new records</a:t>
+            </a:r>
+          </a:p>
+          <a:p>
+            <a:pPr marL="285750" indent="-285750">
+              <a:buFontTx/>
+              <a:buChar char="-"/>
+            </a:pPr>
+            <a:r>
+              <a:rPr lang="en-US" dirty="0"/>
+              <a:t>Citizen science</a:t>
+            </a:r>
+          </a:p>
+          <a:p>
+            <a:endParaRPr lang="en-GB" dirty="0"/>
+          </a:p>
+        </p:txBody>
+      </p:sp>
+      <p:pic>
+        <p:nvPicPr>
+          <p:cNvPr id="13" name="Picture 12">
+            <a:extLst>
+              <a:ext uri="{FF2B5EF4-FFF2-40B4-BE49-F238E27FC236}">
+                <a16:creationId xmlns:a16="http://schemas.microsoft.com/office/drawing/2014/main" id="{32A3DBE6-386D-BD48-A8E0-6535C67786FE}"/>
+              </a:ext>
+            </a:extLst>
+          </p:cNvPr>
+          <p:cNvPicPr>
+            <a:picLocks noChangeAspect="1"/>
+          </p:cNvPicPr>
+          <p:nvPr/>
+        </p:nvPicPr>
+        <p:blipFill>
+          <a:blip r:embed="rId7"/>
+          <a:stretch>
+            <a:fillRect/>
+          </a:stretch>
+        </p:blipFill>
+        <p:spPr>
+          <a:xfrm>
+            <a:off x="23834" y="4742345"/>
+            <a:ext cx="3594100" cy="1790700"/>
+          </a:xfrm>
+          <a:prstGeom prst="rect">
+            <a:avLst/>
+          </a:prstGeom>
+        </p:spPr>
+      </p:pic>
+      <p:sp>
+        <p:nvSpPr>
+          <p:cNvPr id="14" name="TextBox 13">
+            <a:extLst>
+              <a:ext uri="{FF2B5EF4-FFF2-40B4-BE49-F238E27FC236}">
+                <a16:creationId xmlns:a16="http://schemas.microsoft.com/office/drawing/2014/main" id="{CB7B895F-F1BD-BB4E-A5AA-A18E14D6B5D6}"/>
+              </a:ext>
+            </a:extLst>
+          </p:cNvPr>
+          <p:cNvSpPr txBox="1"/>
+          <p:nvPr/>
+        </p:nvSpPr>
+        <p:spPr>
+          <a:xfrm>
+            <a:off x="747706" y="4310707"/>
+            <a:ext cx="1297086" cy="369332"/>
+          </a:xfrm>
+          <a:prstGeom prst="rect">
+            <a:avLst/>
+          </a:prstGeom>
+          <a:noFill/>
+        </p:spPr>
+        <p:txBody>
+          <a:bodyPr wrap="none" rtlCol="0">
+            <a:spAutoFit/>
+          </a:bodyPr>
+          <a:lstStyle/>
+          <a:p>
+            <a:r>
+              <a:rPr lang="en-GB" dirty="0"/>
+              <a:t># of records</a:t>
+            </a:r>
+          </a:p>
+        </p:txBody>
+      </p:sp>
+      <p:pic>
+        <p:nvPicPr>
+          <p:cNvPr id="16" name="Picture 15">
+            <a:extLst>
+              <a:ext uri="{FF2B5EF4-FFF2-40B4-BE49-F238E27FC236}">
+                <a16:creationId xmlns:a16="http://schemas.microsoft.com/office/drawing/2014/main" id="{592CB6EA-3E31-7E45-8CF2-0A97573203C3}"/>
+              </a:ext>
+            </a:extLst>
+          </p:cNvPr>
+          <p:cNvPicPr>
+            <a:picLocks noChangeAspect="1"/>
+          </p:cNvPicPr>
+          <p:nvPr/>
+        </p:nvPicPr>
+        <p:blipFill>
+          <a:blip r:embed="rId8"/>
+          <a:stretch>
+            <a:fillRect/>
+          </a:stretch>
+        </p:blipFill>
+        <p:spPr>
+          <a:xfrm>
+            <a:off x="3478185" y="4738392"/>
+            <a:ext cx="3594100" cy="1790700"/>
+          </a:xfrm>
+          <a:prstGeom prst="rect">
+            <a:avLst/>
+          </a:prstGeom>
+        </p:spPr>
+      </p:pic>
+      <p:sp>
+        <p:nvSpPr>
+          <p:cNvPr id="17" name="TextBox 16">
+            <a:extLst>
+              <a:ext uri="{FF2B5EF4-FFF2-40B4-BE49-F238E27FC236}">
+                <a16:creationId xmlns:a16="http://schemas.microsoft.com/office/drawing/2014/main" id="{B99EAF36-7F30-384C-9630-E5710B49A2B4}"/>
+              </a:ext>
+            </a:extLst>
+          </p:cNvPr>
+          <p:cNvSpPr txBox="1"/>
+          <p:nvPr/>
+        </p:nvSpPr>
+        <p:spPr>
+          <a:xfrm>
+            <a:off x="4229692" y="4263835"/>
+            <a:ext cx="1281120" cy="369332"/>
+          </a:xfrm>
+          <a:prstGeom prst="rect">
+            <a:avLst/>
+          </a:prstGeom>
+          <a:noFill/>
+        </p:spPr>
+        <p:txBody>
+          <a:bodyPr wrap="none" rtlCol="0">
+            <a:spAutoFit/>
+          </a:bodyPr>
+          <a:lstStyle/>
+          <a:p>
+            <a:r>
+              <a:rPr lang="en-GB" dirty="0"/>
+              <a:t># of species</a:t>
+            </a:r>
           </a:p>
         </p:txBody>
       </p:sp>

</xml_diff>